<commit_message>
Update labview 1 training exercise
</commit_message>
<xml_diff>
--- a/Training/LabVIEW-01/FRC-4150-LabVIEW-Training-MODULE-01-2023-11-02.pptx
+++ b/Training/LabVIEW-01/FRC-4150-LabVIEW-Training-MODULE-01-2023-11-02.pptx
@@ -349,7 +349,7 @@
             <a:pPr indent="0" algn="r">
               <a:buNone/>
             </a:pPr>
-            <a:fld id="{7CE1B1C2-F134-491E-9D01-434D15EEF45B}" type="slidenum">
+            <a:fld id="{A71827E1-1E40-475E-86D4-4B45C4C8CE10}" type="slidenum">
               <a:rPr b="0" lang="en-US" sz="1400" spc="-1" strike="noStrike">
                 <a:solidFill>
                   <a:srgbClr val="000000"/>
@@ -403,7 +403,7 @@
         <p:spPr>
           <a:xfrm>
             <a:off x="1257480" y="720720"/>
-            <a:ext cx="4799160" cy="3598920"/>
+            <a:ext cx="4798800" cy="3598560"/>
           </a:xfrm>
           <a:prstGeom prst="rect">
             <a:avLst/>
@@ -426,7 +426,7 @@
         <p:spPr>
           <a:xfrm>
             <a:off x="731880" y="4560840"/>
-            <a:ext cx="5850000" cy="4318200"/>
+            <a:ext cx="5849640" cy="4317840"/>
           </a:xfrm>
           <a:prstGeom prst="rect">
             <a:avLst/>
@@ -466,7 +466,7 @@
         <p:spPr>
           <a:xfrm>
             <a:off x="4143240" y="0"/>
-            <a:ext cx="3168720" cy="478080"/>
+            <a:ext cx="3168360" cy="477720"/>
           </a:xfrm>
           <a:prstGeom prst="rect">
             <a:avLst/>
@@ -540,7 +540,7 @@
         <p:spPr>
           <a:xfrm>
             <a:off x="0" y="9120240"/>
-            <a:ext cx="3168720" cy="478080"/>
+            <a:ext cx="3168360" cy="477720"/>
           </a:xfrm>
           <a:prstGeom prst="rect">
             <a:avLst/>
@@ -614,7 +614,7 @@
         <p:spPr>
           <a:xfrm>
             <a:off x="4143240" y="9120240"/>
-            <a:ext cx="3168720" cy="478080"/>
+            <a:ext cx="3168360" cy="477720"/>
           </a:xfrm>
           <a:prstGeom prst="rect">
             <a:avLst/>
@@ -656,7 +656,7 @@
                 <a:tab algn="l" pos="0"/>
               </a:tabLst>
             </a:pPr>
-            <a:fld id="{8AA43596-45C7-44F0-8B5B-4406BE8017F6}" type="slidenum">
+            <a:fld id="{70EDA15B-4629-461D-ADDB-90C130E4AFB7}" type="slidenum">
               <a:rPr b="0" lang="en-US" sz="1300" spc="-1" strike="noStrike">
                 <a:solidFill>
                   <a:srgbClr val="000000"/>
@@ -710,7 +710,7 @@
         <p:spPr>
           <a:xfrm>
             <a:off x="1257480" y="720720"/>
-            <a:ext cx="4799160" cy="3598920"/>
+            <a:ext cx="4798800" cy="3598560"/>
           </a:xfrm>
           <a:prstGeom prst="rect">
             <a:avLst/>
@@ -733,7 +733,7 @@
         <p:spPr>
           <a:xfrm>
             <a:off x="228600" y="4560840"/>
-            <a:ext cx="6857640" cy="4318200"/>
+            <a:ext cx="6857280" cy="4317840"/>
           </a:xfrm>
           <a:prstGeom prst="rect">
             <a:avLst/>
@@ -1586,7 +1586,7 @@
         <p:spPr>
           <a:xfrm>
             <a:off x="4143240" y="0"/>
-            <a:ext cx="3168720" cy="478080"/>
+            <a:ext cx="3168360" cy="477720"/>
           </a:xfrm>
           <a:prstGeom prst="rect">
             <a:avLst/>
@@ -1660,7 +1660,7 @@
         <p:spPr>
           <a:xfrm>
             <a:off x="0" y="9120240"/>
-            <a:ext cx="3168720" cy="478080"/>
+            <a:ext cx="3168360" cy="477720"/>
           </a:xfrm>
           <a:prstGeom prst="rect">
             <a:avLst/>
@@ -1734,7 +1734,7 @@
         <p:spPr>
           <a:xfrm>
             <a:off x="4143240" y="9120240"/>
-            <a:ext cx="3168720" cy="478080"/>
+            <a:ext cx="3168360" cy="477720"/>
           </a:xfrm>
           <a:prstGeom prst="rect">
             <a:avLst/>
@@ -1776,7 +1776,7 @@
                 <a:tab algn="l" pos="0"/>
               </a:tabLst>
             </a:pPr>
-            <a:fld id="{64AD04EE-ABD2-4768-81BE-D2CD5EB781D4}" type="slidenum">
+            <a:fld id="{73A0CBB8-1270-44B9-A92B-DC27716C12E1}" type="slidenum">
               <a:rPr b="0" lang="en-US" sz="1300" spc="-1" strike="noStrike">
                 <a:solidFill>
                   <a:srgbClr val="000000"/>
@@ -1830,7 +1830,7 @@
         <p:spPr>
           <a:xfrm>
             <a:off x="1257480" y="720720"/>
-            <a:ext cx="4799160" cy="3598920"/>
+            <a:ext cx="4798800" cy="3598560"/>
           </a:xfrm>
           <a:prstGeom prst="rect">
             <a:avLst/>
@@ -1853,7 +1853,7 @@
         <p:spPr>
           <a:xfrm>
             <a:off x="731880" y="4560840"/>
-            <a:ext cx="5850000" cy="4318200"/>
+            <a:ext cx="5849640" cy="4317840"/>
           </a:xfrm>
           <a:prstGeom prst="rect">
             <a:avLst/>
@@ -1893,7 +1893,7 @@
         <p:spPr>
           <a:xfrm>
             <a:off x="4143240" y="0"/>
-            <a:ext cx="3168720" cy="478080"/>
+            <a:ext cx="3168360" cy="477720"/>
           </a:xfrm>
           <a:prstGeom prst="rect">
             <a:avLst/>
@@ -1967,7 +1967,7 @@
         <p:spPr>
           <a:xfrm>
             <a:off x="0" y="9120240"/>
-            <a:ext cx="3168720" cy="478080"/>
+            <a:ext cx="3168360" cy="477720"/>
           </a:xfrm>
           <a:prstGeom prst="rect">
             <a:avLst/>
@@ -2041,7 +2041,7 @@
         <p:spPr>
           <a:xfrm>
             <a:off x="4143240" y="9120240"/>
-            <a:ext cx="3168720" cy="478080"/>
+            <a:ext cx="3168360" cy="477720"/>
           </a:xfrm>
           <a:prstGeom prst="rect">
             <a:avLst/>
@@ -2083,7 +2083,7 @@
                 <a:tab algn="l" pos="0"/>
               </a:tabLst>
             </a:pPr>
-            <a:fld id="{987DE01C-6769-4246-8017-A1A329019D6D}" type="slidenum">
+            <a:fld id="{7FCDC26F-2100-4672-ACCD-08954ED00E8D}" type="slidenum">
               <a:rPr b="0" lang="en-US" sz="1300" spc="-1" strike="noStrike">
                 <a:solidFill>
                   <a:srgbClr val="000000"/>
@@ -2137,7 +2137,7 @@
         <p:spPr>
           <a:xfrm>
             <a:off x="1257480" y="720720"/>
-            <a:ext cx="4799160" cy="3598920"/>
+            <a:ext cx="4798800" cy="3598560"/>
           </a:xfrm>
           <a:prstGeom prst="rect">
             <a:avLst/>
@@ -2160,7 +2160,7 @@
         <p:spPr>
           <a:xfrm>
             <a:off x="731880" y="4560840"/>
-            <a:ext cx="5850000" cy="4318200"/>
+            <a:ext cx="5849640" cy="4317840"/>
           </a:xfrm>
           <a:prstGeom prst="rect">
             <a:avLst/>
@@ -2200,7 +2200,7 @@
         <p:spPr>
           <a:xfrm>
             <a:off x="4143240" y="0"/>
-            <a:ext cx="3168720" cy="478080"/>
+            <a:ext cx="3168360" cy="477720"/>
           </a:xfrm>
           <a:prstGeom prst="rect">
             <a:avLst/>
@@ -2274,7 +2274,7 @@
         <p:spPr>
           <a:xfrm>
             <a:off x="0" y="9120240"/>
-            <a:ext cx="3168720" cy="478080"/>
+            <a:ext cx="3168360" cy="477720"/>
           </a:xfrm>
           <a:prstGeom prst="rect">
             <a:avLst/>
@@ -2348,7 +2348,7 @@
         <p:spPr>
           <a:xfrm>
             <a:off x="4143240" y="9120240"/>
-            <a:ext cx="3168720" cy="478080"/>
+            <a:ext cx="3168360" cy="477720"/>
           </a:xfrm>
           <a:prstGeom prst="rect">
             <a:avLst/>
@@ -2390,7 +2390,7 @@
                 <a:tab algn="l" pos="0"/>
               </a:tabLst>
             </a:pPr>
-            <a:fld id="{3C9AEA61-E9BD-4EB8-BD90-F84E13CD144C}" type="slidenum">
+            <a:fld id="{FCBE478A-39A5-4CDD-8979-A63BF4A65F4B}" type="slidenum">
               <a:rPr b="0" lang="en-US" sz="1300" spc="-1" strike="noStrike">
                 <a:solidFill>
                   <a:srgbClr val="000000"/>
@@ -2444,7 +2444,7 @@
         <p:spPr>
           <a:xfrm>
             <a:off x="1257480" y="720720"/>
-            <a:ext cx="4799160" cy="3598920"/>
+            <a:ext cx="4798800" cy="3598560"/>
           </a:xfrm>
           <a:prstGeom prst="rect">
             <a:avLst/>
@@ -2467,7 +2467,7 @@
         <p:spPr>
           <a:xfrm>
             <a:off x="731880" y="4524840"/>
-            <a:ext cx="5850000" cy="4318200"/>
+            <a:ext cx="5849640" cy="4317840"/>
           </a:xfrm>
           <a:prstGeom prst="rect">
             <a:avLst/>
@@ -4412,7 +4412,7 @@
         <p:spPr>
           <a:xfrm>
             <a:off x="4143240" y="0"/>
-            <a:ext cx="3168720" cy="478080"/>
+            <a:ext cx="3168360" cy="477720"/>
           </a:xfrm>
           <a:prstGeom prst="rect">
             <a:avLst/>
@@ -4486,7 +4486,7 @@
         <p:spPr>
           <a:xfrm>
             <a:off x="0" y="9120240"/>
-            <a:ext cx="3168720" cy="478080"/>
+            <a:ext cx="3168360" cy="477720"/>
           </a:xfrm>
           <a:prstGeom prst="rect">
             <a:avLst/>
@@ -4560,7 +4560,7 @@
         <p:spPr>
           <a:xfrm>
             <a:off x="4143240" y="9120240"/>
-            <a:ext cx="3168720" cy="478080"/>
+            <a:ext cx="3168360" cy="477720"/>
           </a:xfrm>
           <a:prstGeom prst="rect">
             <a:avLst/>
@@ -4602,7 +4602,7 @@
                 <a:tab algn="l" pos="0"/>
               </a:tabLst>
             </a:pPr>
-            <a:fld id="{F5281B92-C868-44C3-838B-D5929471C292}" type="slidenum">
+            <a:fld id="{7798A333-31DA-44CF-94C9-3419FAA41F3C}" type="slidenum">
               <a:rPr b="0" lang="en-US" sz="1300" spc="-1" strike="noStrike">
                 <a:solidFill>
                   <a:srgbClr val="000000"/>
@@ -4656,7 +4656,7 @@
         <p:spPr>
           <a:xfrm>
             <a:off x="1257480" y="720720"/>
-            <a:ext cx="4799160" cy="3598920"/>
+            <a:ext cx="4798800" cy="3598560"/>
           </a:xfrm>
           <a:prstGeom prst="rect">
             <a:avLst/>
@@ -4679,7 +4679,7 @@
         <p:spPr>
           <a:xfrm>
             <a:off x="731880" y="4560840"/>
-            <a:ext cx="5850000" cy="4318200"/>
+            <a:ext cx="5849640" cy="4317840"/>
           </a:xfrm>
           <a:prstGeom prst="rect">
             <a:avLst/>
@@ -8325,7 +8325,7 @@
         <p:spPr>
           <a:xfrm>
             <a:off x="4143240" y="0"/>
-            <a:ext cx="3168720" cy="478080"/>
+            <a:ext cx="3168360" cy="477720"/>
           </a:xfrm>
           <a:prstGeom prst="rect">
             <a:avLst/>
@@ -8399,7 +8399,7 @@
         <p:spPr>
           <a:xfrm>
             <a:off x="0" y="9120240"/>
-            <a:ext cx="3168720" cy="478080"/>
+            <a:ext cx="3168360" cy="477720"/>
           </a:xfrm>
           <a:prstGeom prst="rect">
             <a:avLst/>
@@ -8473,7 +8473,7 @@
         <p:spPr>
           <a:xfrm>
             <a:off x="4143240" y="9120240"/>
-            <a:ext cx="3168720" cy="478080"/>
+            <a:ext cx="3168360" cy="477720"/>
           </a:xfrm>
           <a:prstGeom prst="rect">
             <a:avLst/>
@@ -8515,7 +8515,7 @@
                 <a:tab algn="l" pos="0"/>
               </a:tabLst>
             </a:pPr>
-            <a:fld id="{E02A9B07-2F1A-4BCF-A231-154F165ABB50}" type="slidenum">
+            <a:fld id="{37D83F20-EB5D-4BA6-8F6E-2BD862CEB8ED}" type="slidenum">
               <a:rPr b="0" lang="en-US" sz="1300" spc="-1" strike="noStrike">
                 <a:solidFill>
                   <a:srgbClr val="000000"/>
@@ -8569,7 +8569,7 @@
         <p:spPr>
           <a:xfrm>
             <a:off x="1257480" y="720720"/>
-            <a:ext cx="4799160" cy="3598920"/>
+            <a:ext cx="4798800" cy="3598560"/>
           </a:xfrm>
           <a:prstGeom prst="rect">
             <a:avLst/>
@@ -8592,7 +8592,7 @@
         <p:spPr>
           <a:xfrm>
             <a:off x="731880" y="4560840"/>
-            <a:ext cx="5850000" cy="4318200"/>
+            <a:ext cx="5849640" cy="4317840"/>
           </a:xfrm>
           <a:prstGeom prst="rect">
             <a:avLst/>
@@ -10730,7 +10730,7 @@
         <p:spPr>
           <a:xfrm>
             <a:off x="4143240" y="0"/>
-            <a:ext cx="3168720" cy="478080"/>
+            <a:ext cx="3168360" cy="477720"/>
           </a:xfrm>
           <a:prstGeom prst="rect">
             <a:avLst/>
@@ -10804,7 +10804,7 @@
         <p:spPr>
           <a:xfrm>
             <a:off x="0" y="9120240"/>
-            <a:ext cx="3168720" cy="478080"/>
+            <a:ext cx="3168360" cy="477720"/>
           </a:xfrm>
           <a:prstGeom prst="rect">
             <a:avLst/>
@@ -10878,7 +10878,7 @@
         <p:spPr>
           <a:xfrm>
             <a:off x="4143240" y="9120240"/>
-            <a:ext cx="3168720" cy="478080"/>
+            <a:ext cx="3168360" cy="477720"/>
           </a:xfrm>
           <a:prstGeom prst="rect">
             <a:avLst/>
@@ -10920,7 +10920,7 @@
                 <a:tab algn="l" pos="0"/>
               </a:tabLst>
             </a:pPr>
-            <a:fld id="{43CA2CF6-1054-4A30-A1DE-B060DD9A43CD}" type="slidenum">
+            <a:fld id="{7C97E6D7-A452-4EB8-9125-B90EAECFAA5F}" type="slidenum">
               <a:rPr b="0" lang="en-US" sz="1300" spc="-1" strike="noStrike">
                 <a:solidFill>
                   <a:srgbClr val="000000"/>
@@ -10974,7 +10974,7 @@
         <p:spPr>
           <a:xfrm>
             <a:off x="1257480" y="720720"/>
-            <a:ext cx="4799160" cy="3598920"/>
+            <a:ext cx="4798800" cy="3598560"/>
           </a:xfrm>
           <a:prstGeom prst="rect">
             <a:avLst/>
@@ -10997,7 +10997,7 @@
         <p:spPr>
           <a:xfrm>
             <a:off x="731880" y="4560840"/>
-            <a:ext cx="5850000" cy="4318200"/>
+            <a:ext cx="5849640" cy="4317840"/>
           </a:xfrm>
           <a:prstGeom prst="rect">
             <a:avLst/>
@@ -11037,7 +11037,7 @@
         <p:spPr>
           <a:xfrm>
             <a:off x="4143240" y="0"/>
-            <a:ext cx="3168720" cy="478080"/>
+            <a:ext cx="3168360" cy="477720"/>
           </a:xfrm>
           <a:prstGeom prst="rect">
             <a:avLst/>
@@ -11111,7 +11111,7 @@
         <p:spPr>
           <a:xfrm>
             <a:off x="0" y="9120240"/>
-            <a:ext cx="3168720" cy="478080"/>
+            <a:ext cx="3168360" cy="477720"/>
           </a:xfrm>
           <a:prstGeom prst="rect">
             <a:avLst/>
@@ -11185,7 +11185,7 @@
         <p:spPr>
           <a:xfrm>
             <a:off x="4143240" y="9120240"/>
-            <a:ext cx="3168720" cy="478080"/>
+            <a:ext cx="3168360" cy="477720"/>
           </a:xfrm>
           <a:prstGeom prst="rect">
             <a:avLst/>
@@ -11227,7 +11227,7 @@
                 <a:tab algn="l" pos="0"/>
               </a:tabLst>
             </a:pPr>
-            <a:fld id="{F54375D2-25F6-4FBB-8DE7-E79D7AEECB86}" type="slidenum">
+            <a:fld id="{D85B60DA-4A7E-4ACA-92D8-B34C025B87B1}" type="slidenum">
               <a:rPr b="0" lang="en-US" sz="1300" spc="-1" strike="noStrike">
                 <a:solidFill>
                   <a:srgbClr val="000000"/>
@@ -11281,7 +11281,7 @@
         <p:spPr>
           <a:xfrm>
             <a:off x="1257480" y="720720"/>
-            <a:ext cx="4799160" cy="3598920"/>
+            <a:ext cx="4798800" cy="3598560"/>
           </a:xfrm>
           <a:prstGeom prst="rect">
             <a:avLst/>
@@ -11304,7 +11304,7 @@
         <p:spPr>
           <a:xfrm>
             <a:off x="731880" y="4560840"/>
-            <a:ext cx="5850000" cy="4318200"/>
+            <a:ext cx="5849640" cy="4317840"/>
           </a:xfrm>
           <a:prstGeom prst="rect">
             <a:avLst/>
@@ -11344,7 +11344,7 @@
         <p:spPr>
           <a:xfrm>
             <a:off x="4143240" y="0"/>
-            <a:ext cx="3168720" cy="478080"/>
+            <a:ext cx="3168360" cy="477720"/>
           </a:xfrm>
           <a:prstGeom prst="rect">
             <a:avLst/>
@@ -11418,7 +11418,7 @@
         <p:spPr>
           <a:xfrm>
             <a:off x="0" y="9120240"/>
-            <a:ext cx="3168720" cy="478080"/>
+            <a:ext cx="3168360" cy="477720"/>
           </a:xfrm>
           <a:prstGeom prst="rect">
             <a:avLst/>
@@ -11492,7 +11492,7 @@
         <p:spPr>
           <a:xfrm>
             <a:off x="4143240" y="9120240"/>
-            <a:ext cx="3168720" cy="478080"/>
+            <a:ext cx="3168360" cy="477720"/>
           </a:xfrm>
           <a:prstGeom prst="rect">
             <a:avLst/>
@@ -11534,7 +11534,7 @@
                 <a:tab algn="l" pos="0"/>
               </a:tabLst>
             </a:pPr>
-            <a:fld id="{AC218E43-CF38-49F6-B3C6-6B6D4DD4E140}" type="slidenum">
+            <a:fld id="{5E7BC7F1-48EE-4871-8E74-320C936F5E65}" type="slidenum">
               <a:rPr b="0" lang="en-US" sz="1300" spc="-1" strike="noStrike">
                 <a:solidFill>
                   <a:srgbClr val="000000"/>
@@ -16913,7 +16913,7 @@
         <p:spPr>
           <a:xfrm>
             <a:off x="1143000" y="6419880"/>
-            <a:ext cx="7999560" cy="436680"/>
+            <a:ext cx="7999200" cy="436320"/>
           </a:xfrm>
           <a:prstGeom prst="rect">
             <a:avLst/>
@@ -17002,7 +17002,7 @@
         <p:spPr>
           <a:xfrm>
             <a:off x="0" y="6419880"/>
-            <a:ext cx="1141560" cy="436680"/>
+            <a:ext cx="1141200" cy="436320"/>
           </a:xfrm>
           <a:prstGeom prst="rect">
             <a:avLst/>
@@ -17053,7 +17053,7 @@
         <p:spPr>
           <a:xfrm>
             <a:off x="76320" y="6477120"/>
-            <a:ext cx="989280" cy="358920"/>
+            <a:ext cx="988920" cy="358560"/>
           </a:xfrm>
           <a:prstGeom prst="rect">
             <a:avLst/>
@@ -17072,7 +17072,7 @@
         <p:spPr>
           <a:xfrm>
             <a:off x="0" y="376200"/>
-            <a:ext cx="9001440" cy="1054440"/>
+            <a:ext cx="9001080" cy="1054080"/>
           </a:xfrm>
           <a:prstGeom prst="rect">
             <a:avLst/>
@@ -17119,7 +17119,7 @@
         <p:spPr>
           <a:xfrm>
             <a:off x="990720" y="380880"/>
-            <a:ext cx="2818080" cy="1054440"/>
+            <a:ext cx="2817720" cy="1054080"/>
           </a:xfrm>
           <a:prstGeom prst="rect">
             <a:avLst/>
@@ -17166,7 +17166,7 @@
         <p:spPr>
           <a:xfrm>
             <a:off x="2298600" y="2928960"/>
-            <a:ext cx="6702480" cy="3490920"/>
+            <a:ext cx="6702120" cy="3490560"/>
           </a:xfrm>
           <a:prstGeom prst="rect">
             <a:avLst/>
@@ -17259,7 +17259,7 @@
         <p:spPr>
           <a:xfrm>
             <a:off x="1085760" y="428040"/>
-            <a:ext cx="2551320" cy="926640"/>
+            <a:ext cx="2550960" cy="926280"/>
           </a:xfrm>
           <a:prstGeom prst="rect">
             <a:avLst/>
@@ -17596,7 +17596,7 @@
         <p:spPr>
           <a:xfrm>
             <a:off x="1143000" y="6419880"/>
-            <a:ext cx="7999560" cy="436680"/>
+            <a:ext cx="7999200" cy="436320"/>
           </a:xfrm>
           <a:prstGeom prst="rect">
             <a:avLst/>
@@ -17685,7 +17685,7 @@
         <p:spPr>
           <a:xfrm>
             <a:off x="0" y="6419880"/>
-            <a:ext cx="1141560" cy="436680"/>
+            <a:ext cx="1141200" cy="436320"/>
           </a:xfrm>
           <a:prstGeom prst="rect">
             <a:avLst/>
@@ -17736,7 +17736,7 @@
         <p:spPr>
           <a:xfrm>
             <a:off x="76320" y="6477120"/>
-            <a:ext cx="989280" cy="358920"/>
+            <a:ext cx="988920" cy="358560"/>
           </a:xfrm>
           <a:prstGeom prst="rect">
             <a:avLst/>
@@ -17759,7 +17759,7 @@
         <p:spPr>
           <a:xfrm>
             <a:off x="76320" y="6477120"/>
-            <a:ext cx="989280" cy="358920"/>
+            <a:ext cx="988920" cy="358560"/>
           </a:xfrm>
           <a:prstGeom prst="rect">
             <a:avLst/>
@@ -18096,7 +18096,7 @@
         <p:spPr>
           <a:xfrm>
             <a:off x="1143000" y="6419880"/>
-            <a:ext cx="7999560" cy="436680"/>
+            <a:ext cx="7999200" cy="436320"/>
           </a:xfrm>
           <a:prstGeom prst="rect">
             <a:avLst/>
@@ -18185,7 +18185,7 @@
         <p:spPr>
           <a:xfrm>
             <a:off x="0" y="6419880"/>
-            <a:ext cx="1141560" cy="436680"/>
+            <a:ext cx="1141200" cy="436320"/>
           </a:xfrm>
           <a:prstGeom prst="rect">
             <a:avLst/>
@@ -18236,7 +18236,7 @@
         <p:spPr>
           <a:xfrm>
             <a:off x="76320" y="6477120"/>
-            <a:ext cx="989280" cy="358920"/>
+            <a:ext cx="988920" cy="358560"/>
           </a:xfrm>
           <a:prstGeom prst="rect">
             <a:avLst/>
@@ -18259,7 +18259,7 @@
         <p:spPr>
           <a:xfrm>
             <a:off x="76320" y="6477120"/>
-            <a:ext cx="989280" cy="358920"/>
+            <a:ext cx="988920" cy="358560"/>
           </a:xfrm>
           <a:prstGeom prst="rect">
             <a:avLst/>
@@ -18593,7 +18593,7 @@
         <p:spPr>
           <a:xfrm>
             <a:off x="3427560" y="2112480"/>
-            <a:ext cx="5548320" cy="583200"/>
+            <a:ext cx="5547960" cy="582840"/>
           </a:xfrm>
           <a:prstGeom prst="rect">
             <a:avLst/>
@@ -18648,7 +18648,7 @@
         <p:spPr>
           <a:xfrm>
             <a:off x="3427560" y="3025800"/>
-            <a:ext cx="5548320" cy="700200"/>
+            <a:ext cx="5547960" cy="699840"/>
           </a:xfrm>
           <a:prstGeom prst="rect">
             <a:avLst/>
@@ -18706,7 +18706,7 @@
         <p:spPr>
           <a:xfrm>
             <a:off x="7315200" y="6095880"/>
-            <a:ext cx="1598760" cy="227160"/>
+            <a:ext cx="1598400" cy="226800"/>
           </a:xfrm>
           <a:prstGeom prst="rect">
             <a:avLst/>
@@ -18778,7 +18778,7 @@
         <p:spPr>
           <a:xfrm>
             <a:off x="2362320" y="6095880"/>
-            <a:ext cx="4799160" cy="243000"/>
+            <a:ext cx="4798800" cy="242640"/>
           </a:xfrm>
           <a:prstGeom prst="rect">
             <a:avLst/>
@@ -18850,7 +18850,7 @@
         <p:spPr>
           <a:xfrm>
             <a:off x="8305920" y="6537240"/>
-            <a:ext cx="836640" cy="166680"/>
+            <a:ext cx="836280" cy="166320"/>
           </a:xfrm>
           <a:prstGeom prst="rect">
             <a:avLst/>
@@ -18891,7 +18891,7 @@
                 <a:tab algn="l" pos="0"/>
               </a:tabLst>
             </a:pPr>
-            <a:fld id="{789CE61B-718E-42C7-996E-A82966CDED5C}" type="slidenum">
+            <a:fld id="{E9C4E8FA-92A6-4B72-81FB-33D027BB93A0}" type="slidenum">
               <a:rPr b="0" lang="en-US" sz="1400" spc="-1" strike="noStrike">
                 <a:solidFill>
                   <a:srgbClr val="000000"/>
@@ -18952,7 +18952,7 @@
         <p:spPr>
           <a:xfrm>
             <a:off x="338040" y="318960"/>
-            <a:ext cx="8453520" cy="578160"/>
+            <a:ext cx="8453160" cy="577800"/>
           </a:xfrm>
           <a:prstGeom prst="rect">
             <a:avLst/>
@@ -19007,7 +19007,7 @@
         <p:spPr>
           <a:xfrm>
             <a:off x="338040" y="1065240"/>
-            <a:ext cx="7828200" cy="5181840"/>
+            <a:ext cx="7827840" cy="5181480"/>
           </a:xfrm>
           <a:prstGeom prst="rect">
             <a:avLst/>
@@ -19222,7 +19222,7 @@
         <p:spPr>
           <a:xfrm>
             <a:off x="1371600" y="6553080"/>
-            <a:ext cx="4646880" cy="166680"/>
+            <a:ext cx="4646520" cy="166320"/>
           </a:xfrm>
           <a:prstGeom prst="rect">
             <a:avLst/>
@@ -19294,7 +19294,7 @@
         <p:spPr>
           <a:xfrm>
             <a:off x="6172200" y="6534000"/>
-            <a:ext cx="1675080" cy="169920"/>
+            <a:ext cx="1674720" cy="169560"/>
           </a:xfrm>
           <a:prstGeom prst="rect">
             <a:avLst/>
@@ -19366,7 +19366,7 @@
         <p:spPr>
           <a:xfrm>
             <a:off x="8153280" y="6537240"/>
-            <a:ext cx="836640" cy="166680"/>
+            <a:ext cx="836280" cy="166320"/>
           </a:xfrm>
           <a:prstGeom prst="rect">
             <a:avLst/>
@@ -19407,7 +19407,7 @@
                 <a:tab algn="l" pos="0"/>
               </a:tabLst>
             </a:pPr>
-            <a:fld id="{73E2860D-D64D-4FC6-8972-96A8CADDE5AB}" type="slidenum">
+            <a:fld id="{D2E37DAE-71E8-4E7D-B097-047F171D2238}" type="slidenum">
               <a:rPr b="0" lang="en-US" sz="1400" spc="-1" strike="noStrike">
                 <a:solidFill>
                   <a:srgbClr val="000000"/>
@@ -19468,7 +19468,7 @@
         <p:spPr>
           <a:xfrm>
             <a:off x="338040" y="318960"/>
-            <a:ext cx="8453520" cy="578160"/>
+            <a:ext cx="8453160" cy="577800"/>
           </a:xfrm>
           <a:prstGeom prst="rect">
             <a:avLst/>
@@ -19523,7 +19523,7 @@
         <p:spPr>
           <a:xfrm>
             <a:off x="338040" y="1065240"/>
-            <a:ext cx="8348760" cy="1677960"/>
+            <a:ext cx="8348400" cy="1677600"/>
           </a:xfrm>
           <a:prstGeom prst="rect">
             <a:avLst/>
@@ -19580,7 +19580,7 @@
                 <a:srgbClr val="000000"/>
               </a:buClr>
               <a:buSzPct val="75000"/>
-              <a:buFont typeface="Symbol" charset="2"/>
+              <a:buFont typeface="Symbol"/>
               <a:buChar char=""/>
             </a:pPr>
             <a:r>
@@ -19611,7 +19611,7 @@
                 <a:srgbClr val="000000"/>
               </a:buClr>
               <a:buSzPct val="75000"/>
-              <a:buFont typeface="Symbol" charset="2"/>
+              <a:buFont typeface="Symbol"/>
               <a:buChar char=""/>
             </a:pPr>
             <a:r>
@@ -19645,7 +19645,7 @@
         <p:spPr>
           <a:xfrm>
             <a:off x="1371600" y="6553080"/>
-            <a:ext cx="4646880" cy="166680"/>
+            <a:ext cx="4646520" cy="166320"/>
           </a:xfrm>
           <a:prstGeom prst="rect">
             <a:avLst/>
@@ -19717,7 +19717,7 @@
         <p:spPr>
           <a:xfrm>
             <a:off x="6172200" y="6534000"/>
-            <a:ext cx="1675080" cy="169920"/>
+            <a:ext cx="1674720" cy="169560"/>
           </a:xfrm>
           <a:prstGeom prst="rect">
             <a:avLst/>
@@ -19789,7 +19789,7 @@
         <p:spPr>
           <a:xfrm>
             <a:off x="8153280" y="6537240"/>
-            <a:ext cx="836640" cy="166680"/>
+            <a:ext cx="836280" cy="166320"/>
           </a:xfrm>
           <a:prstGeom prst="rect">
             <a:avLst/>
@@ -19830,7 +19830,7 @@
                 <a:tab algn="l" pos="0"/>
               </a:tabLst>
             </a:pPr>
-            <a:fld id="{6291D751-AE57-41BA-9AF0-5DF3EE476D8D}" type="slidenum">
+            <a:fld id="{2CA3BCBE-5A34-4D02-9B2C-899EF9E20B96}" type="slidenum">
               <a:rPr b="0" lang="en-US" sz="1400" spc="-1" strike="noStrike">
                 <a:solidFill>
                   <a:srgbClr val="000000"/>
@@ -19861,7 +19861,7 @@
         <p:spPr>
           <a:xfrm>
             <a:off x="2054520" y="2765520"/>
-            <a:ext cx="4553640" cy="3474720"/>
+            <a:ext cx="4553280" cy="3474360"/>
           </a:xfrm>
           <a:prstGeom prst="rect">
             <a:avLst/>
@@ -19914,7 +19914,7 @@
         <p:spPr>
           <a:xfrm>
             <a:off x="338040" y="318960"/>
-            <a:ext cx="8453520" cy="578160"/>
+            <a:ext cx="8453160" cy="577800"/>
           </a:xfrm>
           <a:prstGeom prst="rect">
             <a:avLst/>
@@ -19969,7 +19969,7 @@
         <p:spPr>
           <a:xfrm>
             <a:off x="338040" y="1065240"/>
-            <a:ext cx="7828200" cy="5181840"/>
+            <a:ext cx="7827840" cy="5181480"/>
           </a:xfrm>
           <a:prstGeom prst="rect">
             <a:avLst/>
@@ -20277,7 +20277,7 @@
         <p:spPr>
           <a:xfrm>
             <a:off x="1371600" y="6553080"/>
-            <a:ext cx="4646880" cy="166680"/>
+            <a:ext cx="4646520" cy="166320"/>
           </a:xfrm>
           <a:prstGeom prst="rect">
             <a:avLst/>
@@ -20349,7 +20349,7 @@
         <p:spPr>
           <a:xfrm>
             <a:off x="6172200" y="6534000"/>
-            <a:ext cx="1675080" cy="169920"/>
+            <a:ext cx="1674720" cy="169560"/>
           </a:xfrm>
           <a:prstGeom prst="rect">
             <a:avLst/>
@@ -20421,7 +20421,7 @@
         <p:spPr>
           <a:xfrm>
             <a:off x="8153280" y="6537240"/>
-            <a:ext cx="836640" cy="166680"/>
+            <a:ext cx="836280" cy="166320"/>
           </a:xfrm>
           <a:prstGeom prst="rect">
             <a:avLst/>
@@ -20462,7 +20462,7 @@
                 <a:tab algn="l" pos="0"/>
               </a:tabLst>
             </a:pPr>
-            <a:fld id="{CB9FADFB-804A-49CC-83EA-E576F524A3E9}" type="slidenum">
+            <a:fld id="{5B010225-1621-441E-AD24-148D387D9C6A}" type="slidenum">
               <a:rPr b="0" lang="en-US" sz="1400" spc="-1" strike="noStrike">
                 <a:solidFill>
                   <a:srgbClr val="000000"/>
@@ -20523,7 +20523,7 @@
         <p:spPr>
           <a:xfrm>
             <a:off x="338040" y="318960"/>
-            <a:ext cx="8453520" cy="578160"/>
+            <a:ext cx="8453160" cy="577800"/>
           </a:xfrm>
           <a:prstGeom prst="rect">
             <a:avLst/>
@@ -20578,7 +20578,7 @@
         <p:spPr>
           <a:xfrm>
             <a:off x="338040" y="1065240"/>
-            <a:ext cx="7828200" cy="5181840"/>
+            <a:ext cx="7827840" cy="5181480"/>
           </a:xfrm>
           <a:prstGeom prst="rect">
             <a:avLst/>
@@ -20731,7 +20731,7 @@
         <p:spPr>
           <a:xfrm>
             <a:off x="1371600" y="6553080"/>
-            <a:ext cx="4646880" cy="166680"/>
+            <a:ext cx="4646520" cy="166320"/>
           </a:xfrm>
           <a:prstGeom prst="rect">
             <a:avLst/>
@@ -20803,7 +20803,7 @@
         <p:spPr>
           <a:xfrm>
             <a:off x="6172200" y="6534000"/>
-            <a:ext cx="1675080" cy="169920"/>
+            <a:ext cx="1674720" cy="169560"/>
           </a:xfrm>
           <a:prstGeom prst="rect">
             <a:avLst/>
@@ -20875,7 +20875,7 @@
         <p:spPr>
           <a:xfrm>
             <a:off x="8153280" y="6537240"/>
-            <a:ext cx="836640" cy="166680"/>
+            <a:ext cx="836280" cy="166320"/>
           </a:xfrm>
           <a:prstGeom prst="rect">
             <a:avLst/>
@@ -20916,7 +20916,7 @@
                 <a:tab algn="l" pos="0"/>
               </a:tabLst>
             </a:pPr>
-            <a:fld id="{7D49C20E-0A43-443B-BE71-36093C8026EF}" type="slidenum">
+            <a:fld id="{EE82804C-55A8-4688-8762-FB247933AD82}" type="slidenum">
               <a:rPr b="0" lang="en-US" sz="1400" spc="-1" strike="noStrike">
                 <a:solidFill>
                   <a:srgbClr val="000000"/>
@@ -20947,7 +20947,7 @@
         <p:spPr>
           <a:xfrm>
             <a:off x="2962800" y="2580480"/>
-            <a:ext cx="4123800" cy="3666600"/>
+            <a:ext cx="4123440" cy="3666240"/>
           </a:xfrm>
           <a:prstGeom prst="rect">
             <a:avLst/>
@@ -21000,7 +21000,7 @@
         <p:spPr>
           <a:xfrm>
             <a:off x="338040" y="318960"/>
-            <a:ext cx="8453520" cy="578160"/>
+            <a:ext cx="8453160" cy="577800"/>
           </a:xfrm>
           <a:prstGeom prst="rect">
             <a:avLst/>
@@ -21055,7 +21055,7 @@
         <p:spPr>
           <a:xfrm>
             <a:off x="338040" y="1065240"/>
-            <a:ext cx="4005360" cy="5181840"/>
+            <a:ext cx="4005000" cy="5181480"/>
           </a:xfrm>
           <a:prstGeom prst="rect">
             <a:avLst/>
@@ -21301,7 +21301,7 @@
         <p:spPr>
           <a:xfrm>
             <a:off x="1371600" y="6553080"/>
-            <a:ext cx="4646880" cy="166680"/>
+            <a:ext cx="4646520" cy="166320"/>
           </a:xfrm>
           <a:prstGeom prst="rect">
             <a:avLst/>
@@ -21373,7 +21373,7 @@
         <p:spPr>
           <a:xfrm>
             <a:off x="6172200" y="6534000"/>
-            <a:ext cx="1675080" cy="169920"/>
+            <a:ext cx="1674720" cy="169560"/>
           </a:xfrm>
           <a:prstGeom prst="rect">
             <a:avLst/>
@@ -21445,7 +21445,7 @@
         <p:spPr>
           <a:xfrm>
             <a:off x="8153280" y="6537240"/>
-            <a:ext cx="836640" cy="166680"/>
+            <a:ext cx="836280" cy="166320"/>
           </a:xfrm>
           <a:prstGeom prst="rect">
             <a:avLst/>
@@ -21486,7 +21486,7 @@
                 <a:tab algn="l" pos="0"/>
               </a:tabLst>
             </a:pPr>
-            <a:fld id="{FBE52ED5-EC9D-4F7A-8DE7-C35E53065CEE}" type="slidenum">
+            <a:fld id="{85365D79-9FDD-453B-ADFB-0AD0E22A859A}" type="slidenum">
               <a:rPr b="0" lang="en-US" sz="1400" spc="-1" strike="noStrike">
                 <a:solidFill>
                   <a:srgbClr val="000000"/>
@@ -21517,7 +21517,7 @@
         <p:spPr>
           <a:xfrm>
             <a:off x="4311360" y="1370520"/>
-            <a:ext cx="4572000" cy="3794760"/>
+            <a:ext cx="4571640" cy="3794400"/>
           </a:xfrm>
           <a:prstGeom prst="rect">
             <a:avLst/>
@@ -21570,7 +21570,7 @@
         <p:spPr>
           <a:xfrm>
             <a:off x="338040" y="318960"/>
-            <a:ext cx="8453520" cy="578160"/>
+            <a:ext cx="8453160" cy="577800"/>
           </a:xfrm>
           <a:prstGeom prst="rect">
             <a:avLst/>
@@ -21625,7 +21625,7 @@
         <p:spPr>
           <a:xfrm>
             <a:off x="338040" y="1065240"/>
-            <a:ext cx="7828200" cy="992160"/>
+            <a:ext cx="7827840" cy="991800"/>
           </a:xfrm>
           <a:prstGeom prst="rect">
             <a:avLst/>
@@ -21705,7 +21705,7 @@
         <p:spPr>
           <a:xfrm>
             <a:off x="1371600" y="6553080"/>
-            <a:ext cx="4646880" cy="166680"/>
+            <a:ext cx="4646520" cy="166320"/>
           </a:xfrm>
           <a:prstGeom prst="rect">
             <a:avLst/>
@@ -21777,7 +21777,7 @@
         <p:spPr>
           <a:xfrm>
             <a:off x="6172200" y="6534000"/>
-            <a:ext cx="1675080" cy="169920"/>
+            <a:ext cx="1674720" cy="169560"/>
           </a:xfrm>
           <a:prstGeom prst="rect">
             <a:avLst/>
@@ -21849,7 +21849,7 @@
         <p:spPr>
           <a:xfrm>
             <a:off x="8153280" y="6537240"/>
-            <a:ext cx="836640" cy="166680"/>
+            <a:ext cx="836280" cy="166320"/>
           </a:xfrm>
           <a:prstGeom prst="rect">
             <a:avLst/>
@@ -21890,7 +21890,7 @@
                 <a:tab algn="l" pos="0"/>
               </a:tabLst>
             </a:pPr>
-            <a:fld id="{86C49115-4BF2-438F-B450-D288D5660C31}" type="slidenum">
+            <a:fld id="{22625AD8-4143-4D2D-B194-514A212E5F7E}" type="slidenum">
               <a:rPr b="0" lang="en-US" sz="1400" spc="-1" strike="noStrike">
                 <a:solidFill>
                   <a:srgbClr val="000000"/>
@@ -21921,7 +21921,7 @@
         <p:spPr>
           <a:xfrm>
             <a:off x="2505600" y="2514600"/>
-            <a:ext cx="2752200" cy="749880"/>
+            <a:ext cx="2751840" cy="749520"/>
           </a:xfrm>
           <a:prstGeom prst="rect">
             <a:avLst/>
@@ -21974,7 +21974,7 @@
         <p:spPr>
           <a:xfrm>
             <a:off x="338040" y="318960"/>
-            <a:ext cx="8453520" cy="578160"/>
+            <a:ext cx="8453160" cy="577800"/>
           </a:xfrm>
           <a:prstGeom prst="rect">
             <a:avLst/>
@@ -22029,7 +22029,7 @@
         <p:spPr>
           <a:xfrm>
             <a:off x="338040" y="1065240"/>
-            <a:ext cx="7828200" cy="1449360"/>
+            <a:ext cx="7827840" cy="1449000"/>
           </a:xfrm>
           <a:prstGeom prst="rect">
             <a:avLst/>
@@ -22140,7 +22140,7 @@
         <p:spPr>
           <a:xfrm>
             <a:off x="1371600" y="6553080"/>
-            <a:ext cx="4646880" cy="166680"/>
+            <a:ext cx="4646520" cy="166320"/>
           </a:xfrm>
           <a:prstGeom prst="rect">
             <a:avLst/>
@@ -22212,7 +22212,7 @@
         <p:spPr>
           <a:xfrm>
             <a:off x="6172200" y="6534000"/>
-            <a:ext cx="1675080" cy="169920"/>
+            <a:ext cx="1674720" cy="169560"/>
           </a:xfrm>
           <a:prstGeom prst="rect">
             <a:avLst/>
@@ -22284,7 +22284,7 @@
         <p:spPr>
           <a:xfrm>
             <a:off x="8153280" y="6537240"/>
-            <a:ext cx="836640" cy="166680"/>
+            <a:ext cx="836280" cy="166320"/>
           </a:xfrm>
           <a:prstGeom prst="rect">
             <a:avLst/>
@@ -22325,7 +22325,7 @@
                 <a:tab algn="l" pos="0"/>
               </a:tabLst>
             </a:pPr>
-            <a:fld id="{073F8A56-34D0-4A02-86BA-B820A69E363D}" type="slidenum">
+            <a:fld id="{D08C3B9E-A311-448B-8ECB-6F8CA5A690E4}" type="slidenum">
               <a:rPr b="0" lang="en-US" sz="1400" spc="-1" strike="noStrike">
                 <a:solidFill>
                   <a:srgbClr val="000000"/>
@@ -22356,7 +22356,7 @@
         <p:spPr>
           <a:xfrm>
             <a:off x="871200" y="2647800"/>
-            <a:ext cx="7315200" cy="3108960"/>
+            <a:ext cx="7314840" cy="3108600"/>
           </a:xfrm>
           <a:prstGeom prst="rect">
             <a:avLst/>
@@ -22409,7 +22409,7 @@
         <p:spPr>
           <a:xfrm>
             <a:off x="338040" y="318960"/>
-            <a:ext cx="8453520" cy="578160"/>
+            <a:ext cx="8453160" cy="577800"/>
           </a:xfrm>
           <a:prstGeom prst="rect">
             <a:avLst/>
@@ -22464,7 +22464,7 @@
         <p:spPr>
           <a:xfrm>
             <a:off x="338040" y="993240"/>
-            <a:ext cx="8439120" cy="5181840"/>
+            <a:ext cx="8438760" cy="5181480"/>
           </a:xfrm>
           <a:prstGeom prst="rect">
             <a:avLst/>
@@ -22494,7 +22494,7 @@
               <a:buChar char=""/>
             </a:pPr>
             <a:r>
-              <a:rPr b="1" lang="en-US" sz="2000" spc="-1" strike="noStrike">
+              <a:rPr b="1" lang="en-US" sz="1800" spc="-1" strike="noStrike">
                 <a:solidFill>
                   <a:srgbClr val="000000"/>
                 </a:solidFill>
@@ -22502,7 +22502,7 @@
               </a:rPr>
               <a:t>An encoder counts up as a motor or other device rotates</a:t>
             </a:r>
-            <a:endParaRPr b="0" lang="en-US" sz="2000" spc="-1" strike="noStrike">
+            <a:endParaRPr b="0" lang="en-US" sz="1800" spc="-1" strike="noStrike">
               <a:solidFill>
                 <a:srgbClr val="000000"/>
               </a:solidFill>
@@ -22524,7 +22524,7 @@
               <a:buChar char="–"/>
             </a:pPr>
             <a:r>
-              <a:rPr b="0" lang="en-US" sz="1800" spc="-1" strike="noStrike">
+              <a:rPr b="0" lang="en-US" sz="1600" spc="-1" strike="noStrike">
                 <a:solidFill>
                   <a:srgbClr val="000000"/>
                 </a:solidFill>
@@ -22532,7 +22532,7 @@
               </a:rPr>
               <a:t>An encoder has a specific number of counts per rotation.</a:t>
             </a:r>
-            <a:endParaRPr b="0" lang="en-US" sz="1800" spc="-1" strike="noStrike">
+            <a:endParaRPr b="0" lang="en-US" sz="1600" spc="-1" strike="noStrike">
               <a:solidFill>
                 <a:srgbClr val="000000"/>
               </a:solidFill>
@@ -22554,7 +22554,7 @@
               <a:buChar char="–"/>
             </a:pPr>
             <a:r>
-              <a:rPr b="0" lang="en-US" sz="1800" spc="-1" strike="noStrike">
+              <a:rPr b="0" lang="en-US" sz="1600" spc="-1" strike="noStrike">
                 <a:solidFill>
                   <a:srgbClr val="000000"/>
                 </a:solidFill>
@@ -22562,7 +22562,7 @@
               </a:rPr>
               <a:t>Depending on the type of encoder this sometimes has to be multiplied by 2 or 4 to get the number of edge counts per rotation.</a:t>
             </a:r>
-            <a:endParaRPr b="0" lang="en-US" sz="1800" spc="-1" strike="noStrike">
+            <a:endParaRPr b="0" lang="en-US" sz="1600" spc="-1" strike="noStrike">
               <a:solidFill>
                 <a:srgbClr val="000000"/>
               </a:solidFill>
@@ -22585,15 +22585,15 @@
               <a:buChar char=""/>
             </a:pPr>
             <a:r>
-              <a:rPr b="1" lang="en-US" sz="2000" spc="-1" strike="noStrike">
-                <a:solidFill>
-                  <a:srgbClr val="000000"/>
-                </a:solidFill>
-                <a:latin typeface="Arial"/>
-              </a:rPr>
-              <a:t>This encoder is being used on our robot drive.  The encoder is connected directly to the wheels (gear ratio of 1:1).  The encoder has 1440 edge counts/rotation.</a:t>
-            </a:r>
-            <a:endParaRPr b="0" lang="en-US" sz="2000" spc="-1" strike="noStrike">
+              <a:rPr b="1" lang="en-US" sz="1800" spc="-1" strike="noStrike">
+                <a:solidFill>
+                  <a:srgbClr val="000000"/>
+                </a:solidFill>
+                <a:latin typeface="Arial"/>
+              </a:rPr>
+              <a:t>This encoder is being used on our robot drive.  The encoder is connected directly to the wheels (gear ratio of 1:1 [input:output]).  The encoder has 1440 edge counts/rotation.</a:t>
+            </a:r>
+            <a:endParaRPr b="0" lang="en-US" sz="1800" spc="-1" strike="noStrike">
               <a:solidFill>
                 <a:srgbClr val="000000"/>
               </a:solidFill>
@@ -22616,7 +22616,7 @@
               <a:buChar char=""/>
             </a:pPr>
             <a:r>
-              <a:rPr b="1" lang="en-US" sz="2000" spc="-1" strike="noStrike">
+              <a:rPr b="1" lang="en-US" sz="1800" spc="-1" strike="noStrike">
                 <a:solidFill>
                   <a:srgbClr val="000000"/>
                 </a:solidFill>
@@ -22624,7 +22624,7 @@
               </a:rPr>
               <a:t>The wheels have a diameter of 6 inches.</a:t>
             </a:r>
-            <a:endParaRPr b="0" lang="en-US" sz="2000" spc="-1" strike="noStrike">
+            <a:endParaRPr b="0" lang="en-US" sz="1800" spc="-1" strike="noStrike">
               <a:solidFill>
                 <a:srgbClr val="000000"/>
               </a:solidFill>
@@ -22647,35 +22647,157 @@
               <a:buChar char=""/>
             </a:pPr>
             <a:r>
-              <a:rPr b="1" lang="en-US" sz="2000" spc="-1" strike="noStrike">
-                <a:solidFill>
-                  <a:srgbClr val="000000"/>
-                </a:solidFill>
-                <a:latin typeface="Arial"/>
-              </a:rPr>
-              <a:t>To use the encoder to calculate distance traveled in feet, the number of feet for each count needs to be determined.  Write a VI to perform this calulation.  Allow the VI to take different count edges/rotation, diameters, and gear ratios as inputs.</a:t>
-            </a:r>
-            <a:endParaRPr b="0" lang="en-US" sz="2000" spc="-1" strike="noStrike">
-              <a:solidFill>
-                <a:srgbClr val="000000"/>
-              </a:solidFill>
-              <a:latin typeface="Arial"/>
-            </a:endParaRPr>
-          </a:p>
-          <a:p>
-            <a:pPr indent="0">
+              <a:rPr b="1" lang="en-US" sz="1800" spc="-1" strike="noStrike">
+                <a:solidFill>
+                  <a:srgbClr val="000000"/>
+                </a:solidFill>
+                <a:latin typeface="Arial"/>
+              </a:rPr>
+              <a:t>Based on user entered – counts/rotation, wheel diameter, and gear ratio, calculate and display the constant to convert counts to feet.  (The units of the conversion factor will be Ft/Count).</a:t>
+            </a:r>
+            <a:endParaRPr b="0" lang="en-US" sz="1800" spc="-1" strike="noStrike">
+              <a:solidFill>
+                <a:srgbClr val="000000"/>
+              </a:solidFill>
+              <a:latin typeface="Arial"/>
+            </a:endParaRPr>
+          </a:p>
+          <a:p>
+            <a:pPr marL="290520" indent="-290160">
               <a:lnSpc>
                 <a:spcPct val="100000"/>
               </a:lnSpc>
               <a:spcBef>
                 <a:spcPts val="1100"/>
               </a:spcBef>
-              <a:buNone/>
-              <a:tabLst>
-                <a:tab algn="l" pos="0"/>
-              </a:tabLst>
-            </a:pPr>
-            <a:endParaRPr b="0" lang="en-US" sz="2000" spc="-1" strike="noStrike">
+              <a:buClr>
+                <a:srgbClr val="255d90"/>
+              </a:buClr>
+              <a:buSzPct val="65000"/>
+              <a:buFont typeface="Monotype Sorts" charset="2"/>
+              <a:buChar char=""/>
+            </a:pPr>
+            <a:r>
+              <a:rPr b="1" lang="en-US" sz="1800" spc="-1" strike="noStrike">
+                <a:solidFill>
+                  <a:srgbClr val="000000"/>
+                </a:solidFill>
+                <a:latin typeface="Arial"/>
+              </a:rPr>
+              <a:t>Add an input for the number of encoder counts traveled.  Calculate and display the number of feet traveled.  </a:t>
+            </a:r>
+            <a:endParaRPr b="0" lang="en-US" sz="1800" spc="-1" strike="noStrike">
+              <a:solidFill>
+                <a:srgbClr val="000000"/>
+              </a:solidFill>
+              <a:latin typeface="Arial"/>
+            </a:endParaRPr>
+          </a:p>
+          <a:p>
+            <a:pPr marL="290520" indent="-290160">
+              <a:lnSpc>
+                <a:spcPct val="100000"/>
+              </a:lnSpc>
+              <a:spcBef>
+                <a:spcPts val="1100"/>
+              </a:spcBef>
+              <a:buClr>
+                <a:srgbClr val="255d90"/>
+              </a:buClr>
+              <a:buSzPct val="65000"/>
+              <a:buFont typeface="Monotype Sorts" charset="2"/>
+              <a:buChar char=""/>
+            </a:pPr>
+            <a:r>
+              <a:rPr b="1" lang="en-US" sz="1800" spc="-1" strike="noStrike">
+                <a:solidFill>
+                  <a:srgbClr val="000000"/>
+                </a:solidFill>
+                <a:latin typeface="Arial"/>
+              </a:rPr>
+              <a:t>Todo:</a:t>
+            </a:r>
+            <a:endParaRPr b="0" lang="en-US" sz="1800" spc="-1" strike="noStrike">
+              <a:solidFill>
+                <a:srgbClr val="000000"/>
+              </a:solidFill>
+              <a:latin typeface="Arial"/>
+            </a:endParaRPr>
+          </a:p>
+          <a:p>
+            <a:pPr lvl="1" marL="685800" indent="-228240">
+              <a:lnSpc>
+                <a:spcPct val="100000"/>
+              </a:lnSpc>
+              <a:spcBef>
+                <a:spcPts val="720"/>
+              </a:spcBef>
+              <a:buClr>
+                <a:srgbClr val="fcb131"/>
+              </a:buClr>
+              <a:buFont typeface="Arial"/>
+              <a:buChar char="–"/>
+            </a:pPr>
+            <a:r>
+              <a:rPr b="0" lang="en-US" sz="1600" spc="-1" strike="noStrike">
+                <a:solidFill>
+                  <a:srgbClr val="000000"/>
+                </a:solidFill>
+                <a:latin typeface="Arial"/>
+              </a:rPr>
+              <a:t>Write the list of inputs and outputs</a:t>
+            </a:r>
+            <a:endParaRPr b="0" lang="en-US" sz="1600" spc="-1" strike="noStrike">
+              <a:solidFill>
+                <a:srgbClr val="000000"/>
+              </a:solidFill>
+              <a:latin typeface="Arial"/>
+            </a:endParaRPr>
+          </a:p>
+          <a:p>
+            <a:pPr lvl="1" marL="685800" indent="-228240">
+              <a:lnSpc>
+                <a:spcPct val="100000"/>
+              </a:lnSpc>
+              <a:spcBef>
+                <a:spcPts val="720"/>
+              </a:spcBef>
+              <a:buClr>
+                <a:srgbClr val="fcb131"/>
+              </a:buClr>
+              <a:buFont typeface="Arial"/>
+              <a:buChar char="–"/>
+            </a:pPr>
+            <a:r>
+              <a:rPr b="0" lang="en-US" sz="1600" spc="-1" strike="noStrike">
+                <a:solidFill>
+                  <a:srgbClr val="000000"/>
+                </a:solidFill>
+                <a:latin typeface="Arial"/>
+              </a:rPr>
+              <a:t>Write a VI to perform these calulations and display the results</a:t>
+            </a:r>
+            <a:endParaRPr b="0" lang="en-US" sz="1600" spc="-1" strike="noStrike">
+              <a:solidFill>
+                <a:srgbClr val="000000"/>
+              </a:solidFill>
+              <a:latin typeface="Arial"/>
+            </a:endParaRPr>
+          </a:p>
+          <a:p>
+            <a:pPr indent="0">
+              <a:lnSpc>
+                <a:spcPct val="100000"/>
+              </a:lnSpc>
+              <a:spcBef>
+                <a:spcPts val="1100"/>
+              </a:spcBef>
+              <a:buNone/>
+              <a:tabLst>
+                <a:tab algn="l" pos="0"/>
+              </a:tabLst>
+            </a:pPr>
+            <a:endParaRPr b="0" lang="en-US" sz="1600" spc="-1" strike="noStrike">
               <a:solidFill>
                 <a:srgbClr val="000000"/>
               </a:solidFill>
@@ -22697,7 +22819,7 @@
         <p:spPr>
           <a:xfrm>
             <a:off x="1371600" y="6553080"/>
-            <a:ext cx="4646880" cy="166680"/>
+            <a:ext cx="4646520" cy="166320"/>
           </a:xfrm>
           <a:prstGeom prst="rect">
             <a:avLst/>
@@ -22769,7 +22891,7 @@
         <p:spPr>
           <a:xfrm>
             <a:off x="6172200" y="6534000"/>
-            <a:ext cx="1675080" cy="169920"/>
+            <a:ext cx="1674720" cy="169560"/>
           </a:xfrm>
           <a:prstGeom prst="rect">
             <a:avLst/>
@@ -22841,7 +22963,7 @@
         <p:spPr>
           <a:xfrm>
             <a:off x="8153280" y="6537240"/>
-            <a:ext cx="836640" cy="166680"/>
+            <a:ext cx="836280" cy="166320"/>
           </a:xfrm>
           <a:prstGeom prst="rect">
             <a:avLst/>
@@ -22882,7 +23004,7 @@
                 <a:tab algn="l" pos="0"/>
               </a:tabLst>
             </a:pPr>
-            <a:fld id="{10CD4F81-2CB4-4715-AB18-A4B6056CEBF6}" type="slidenum">
+            <a:fld id="{3769FB06-017B-402A-945C-3CF82A39D058}" type="slidenum">
               <a:rPr b="0" lang="en-US" sz="1400" spc="-1" strike="noStrike">
                 <a:solidFill>
                   <a:srgbClr val="000000"/>

</xml_diff>